<commit_message>
updated ppt for module 7
</commit_message>
<xml_diff>
--- a/nodejs-m7-routing-in-depth/slides/nodejs-m7-routing-in-depth.pptx
+++ b/nodejs-m7-routing-in-depth/slides/nodejs-m7-routing-in-depth.pptx
@@ -217,7 +217,7 @@
           <a:p>
             <a:fld id="{A0B41EB9-7971-5544-BD7F-525B22CFBC36}" type="datetimeFigureOut">
               <a:rPr lang="en-US" smtClean="0"/>
-              <a:t>7/25/2017</a:t>
+              <a:t>7/26/2017</a:t>
             </a:fld>
             <a:endParaRPr lang="en-US"/>
           </a:p>
@@ -382,7 +382,7 @@
           <a:p>
             <a:fld id="{205CF534-097E-6546-AAC2-359745A6CD51}" type="datetimeFigureOut">
               <a:rPr lang="en-US" smtClean="0"/>
-              <a:t>7/25/2017</a:t>
+              <a:t>7/26/2017</a:t>
             </a:fld>
             <a:endParaRPr lang="en-US"/>
           </a:p>
@@ -5149,7 +5149,14 @@
             <a:pPr fontAlgn="base"/>
             <a:r>
               <a:rPr lang="en-US" dirty="0"/>
-              <a:t>Route parameters mandatory but make parameters optional by using route params</a:t>
+              <a:t>Route parameters are mandatory </a:t>
+            </a:r>
+          </a:p>
+          <a:p>
+            <a:pPr fontAlgn="base"/>
+            <a:r>
+              <a:rPr lang="en-US" dirty="0"/>
+              <a:t>To make parameters optional use query string</a:t>
             </a:r>
             <a:endParaRPr lang="en-US" b="1" dirty="0"/>
           </a:p>
@@ -5470,7 +5477,7 @@
                 </a:solidFill>
                 <a:latin typeface="Consolas" panose="020B0609020204030204" pitchFamily="49" charset="0"/>
               </a:rPr>
-              <a:t>params</a:t>
+              <a:t>query</a:t>
             </a:r>
             <a:r>
               <a:rPr lang="en-US" sz="2000" dirty="0">
@@ -5534,7 +5541,7 @@
             </a:br>
             <a:r>
               <a:rPr lang="en-US" b="1" dirty="0" err="1"/>
-              <a:t>req.queryParams</a:t>
+              <a:t>req.query</a:t>
             </a:r>
             <a:r>
               <a:rPr lang="en-US" b="1" dirty="0"/>

</xml_diff>